<commit_message>
Jeg havde ændret noget
</commit_message>
<xml_diff>
--- a/PCS_Press.pptx
+++ b/PCS_Press.pptx
@@ -3341,14 +3341,14 @@
           <a:lstStyle/>
           <a:p>
             <a:r>
-              <a:rPr lang="en-US"/>
+              <a:rPr lang="en-US" dirty="0"/>
               <a:t>Cross-site </a:t>
             </a:r>
             <a:r>
-              <a:rPr lang="en-US" smtClean="0"/>
+              <a:rPr lang="en-US" dirty="0" smtClean="0"/>
               <a:t>Timing Attacks</a:t>
             </a:r>
-            <a:endParaRPr lang="en-US"/>
+            <a:endParaRPr lang="en-US" dirty="0"/>
           </a:p>
         </p:txBody>
       </p:sp>

</xml_diff>

<commit_message>
Mangler vist kun info fra PTXDK
</commit_message>
<xml_diff>
--- a/PCS_Press.pptx
+++ b/PCS_Press.pptx
@@ -8,8 +8,12 @@
     <p:sldId id="256" r:id="rId2"/>
     <p:sldId id="257" r:id="rId3"/>
     <p:sldId id="258" r:id="rId4"/>
-    <p:sldId id="259" r:id="rId5"/>
-    <p:sldId id="260" r:id="rId6"/>
+    <p:sldId id="264" r:id="rId5"/>
+    <p:sldId id="259" r:id="rId6"/>
+    <p:sldId id="260" r:id="rId7"/>
+    <p:sldId id="261" r:id="rId8"/>
+    <p:sldId id="262" r:id="rId9"/>
+    <p:sldId id="263" r:id="rId10"/>
   </p:sldIdLst>
   <p:sldSz cx="12192000" cy="6858000"/>
   <p:notesSz cx="6858000" cy="9144000"/>
@@ -108,6 +112,11 @@
       </a:defRPr>
     </a:lvl9pPr>
   </p:defaultTextStyle>
+  <p:extLst>
+    <p:ext uri="{EFAFB233-063F-42B5-8137-9DF3F51BA10A}">
+      <p15:sldGuideLst xmlns:p15="http://schemas.microsoft.com/office/powerpoint/2012/main"/>
+    </p:ext>
+  </p:extLst>
 </p:presentation>
 </file>
 
@@ -242,7 +251,7 @@
           <a:p>
             <a:fld id="{DB548A0F-D8CD-D54A-9D4E-BD79963C8BCE}" type="datetimeFigureOut">
               <a:rPr lang="en-US" smtClean="0"/>
-              <a:t>6/14/16</a:t>
+              <a:t>6/16/16</a:t>
             </a:fld>
             <a:endParaRPr lang="en-US"/>
           </a:p>
@@ -412,7 +421,7 @@
           <a:p>
             <a:fld id="{DB548A0F-D8CD-D54A-9D4E-BD79963C8BCE}" type="datetimeFigureOut">
               <a:rPr lang="en-US" smtClean="0"/>
-              <a:t>6/14/16</a:t>
+              <a:t>6/16/16</a:t>
             </a:fld>
             <a:endParaRPr lang="en-US"/>
           </a:p>
@@ -592,7 +601,7 @@
           <a:p>
             <a:fld id="{DB548A0F-D8CD-D54A-9D4E-BD79963C8BCE}" type="datetimeFigureOut">
               <a:rPr lang="en-US" smtClean="0"/>
-              <a:t>6/14/16</a:t>
+              <a:t>6/16/16</a:t>
             </a:fld>
             <a:endParaRPr lang="en-US"/>
           </a:p>
@@ -762,7 +771,7 @@
           <a:p>
             <a:fld id="{DB548A0F-D8CD-D54A-9D4E-BD79963C8BCE}" type="datetimeFigureOut">
               <a:rPr lang="en-US" smtClean="0"/>
-              <a:t>6/14/16</a:t>
+              <a:t>6/16/16</a:t>
             </a:fld>
             <a:endParaRPr lang="en-US"/>
           </a:p>
@@ -1008,7 +1017,7 @@
           <a:p>
             <a:fld id="{DB548A0F-D8CD-D54A-9D4E-BD79963C8BCE}" type="datetimeFigureOut">
               <a:rPr lang="en-US" smtClean="0"/>
-              <a:t>6/14/16</a:t>
+              <a:t>6/16/16</a:t>
             </a:fld>
             <a:endParaRPr lang="en-US"/>
           </a:p>
@@ -1240,7 +1249,7 @@
           <a:p>
             <a:fld id="{DB548A0F-D8CD-D54A-9D4E-BD79963C8BCE}" type="datetimeFigureOut">
               <a:rPr lang="en-US" smtClean="0"/>
-              <a:t>6/14/16</a:t>
+              <a:t>6/16/16</a:t>
             </a:fld>
             <a:endParaRPr lang="en-US"/>
           </a:p>
@@ -1607,7 +1616,7 @@
           <a:p>
             <a:fld id="{DB548A0F-D8CD-D54A-9D4E-BD79963C8BCE}" type="datetimeFigureOut">
               <a:rPr lang="en-US" smtClean="0"/>
-              <a:t>6/14/16</a:t>
+              <a:t>6/16/16</a:t>
             </a:fld>
             <a:endParaRPr lang="en-US"/>
           </a:p>
@@ -1725,7 +1734,7 @@
           <a:p>
             <a:fld id="{DB548A0F-D8CD-D54A-9D4E-BD79963C8BCE}" type="datetimeFigureOut">
               <a:rPr lang="en-US" smtClean="0"/>
-              <a:t>6/14/16</a:t>
+              <a:t>6/16/16</a:t>
             </a:fld>
             <a:endParaRPr lang="en-US"/>
           </a:p>
@@ -1820,7 +1829,7 @@
           <a:p>
             <a:fld id="{DB548A0F-D8CD-D54A-9D4E-BD79963C8BCE}" type="datetimeFigureOut">
               <a:rPr lang="en-US" smtClean="0"/>
-              <a:t>6/14/16</a:t>
+              <a:t>6/16/16</a:t>
             </a:fld>
             <a:endParaRPr lang="en-US"/>
           </a:p>
@@ -2097,7 +2106,7 @@
           <a:p>
             <a:fld id="{DB548A0F-D8CD-D54A-9D4E-BD79963C8BCE}" type="datetimeFigureOut">
               <a:rPr lang="en-US" smtClean="0"/>
-              <a:t>6/14/16</a:t>
+              <a:t>6/16/16</a:t>
             </a:fld>
             <a:endParaRPr lang="en-US"/>
           </a:p>
@@ -2350,7 +2359,7 @@
           <a:p>
             <a:fld id="{DB548A0F-D8CD-D54A-9D4E-BD79963C8BCE}" type="datetimeFigureOut">
               <a:rPr lang="en-US" smtClean="0"/>
-              <a:t>6/14/16</a:t>
+              <a:t>6/16/16</a:t>
             </a:fld>
             <a:endParaRPr lang="en-US"/>
           </a:p>
@@ -2563,7 +2572,7 @@
           <a:p>
             <a:fld id="{DB548A0F-D8CD-D54A-9D4E-BD79963C8BCE}" type="datetimeFigureOut">
               <a:rPr lang="en-US" smtClean="0"/>
-              <a:t>6/14/16</a:t>
+              <a:t>6/16/16</a:t>
             </a:fld>
             <a:endParaRPr lang="en-US"/>
           </a:p>
@@ -3013,41 +3022,59 @@
           <a:bodyPr/>
           <a:lstStyle/>
           <a:p>
-            <a:endParaRPr lang="en-US" dirty="0" smtClean="0"/>
-          </a:p>
-          <a:p>
-            <a:r>
-              <a:rPr lang="en-US" dirty="0" smtClean="0"/>
+            <a:endParaRPr lang="en-US" b="1" dirty="0" smtClean="0">
+              <a:latin typeface="+mj-lt"/>
+            </a:endParaRPr>
+          </a:p>
+          <a:p>
+            <a:r>
+              <a:rPr lang="en-US" b="1" dirty="0" smtClean="0">
+                <a:latin typeface="+mj-lt"/>
+              </a:rPr>
               <a:t>Mads </a:t>
             </a:r>
             <a:r>
-              <a:rPr lang="en-US" dirty="0" err="1" smtClean="0"/>
+              <a:rPr lang="en-US" b="1" dirty="0" err="1" smtClean="0">
+                <a:latin typeface="+mj-lt"/>
+              </a:rPr>
               <a:t>Rogild</a:t>
             </a:r>
             <a:r>
-              <a:rPr lang="en-US" dirty="0" smtClean="0"/>
+              <a:rPr lang="en-US" b="1" dirty="0" smtClean="0">
+                <a:latin typeface="+mj-lt"/>
+              </a:rPr>
               <a:t>, Patrick </a:t>
             </a:r>
             <a:r>
-              <a:rPr lang="en-US" dirty="0" err="1" smtClean="0"/>
+              <a:rPr lang="en-US" b="1" dirty="0" err="1" smtClean="0">
+                <a:latin typeface="+mj-lt"/>
+              </a:rPr>
               <a:t>Krøll</a:t>
             </a:r>
             <a:r>
-              <a:rPr lang="en-US" dirty="0" smtClean="0"/>
+              <a:rPr lang="en-US" b="1" dirty="0" smtClean="0">
+                <a:latin typeface="+mj-lt"/>
+              </a:rPr>
               <a:t> Brandt,</a:t>
             </a:r>
           </a:p>
           <a:p>
             <a:r>
-              <a:rPr lang="en-US" dirty="0" smtClean="0"/>
+              <a:rPr lang="en-US" b="1" dirty="0" smtClean="0">
+                <a:latin typeface="+mj-lt"/>
+              </a:rPr>
               <a:t> Emil Sander </a:t>
             </a:r>
             <a:r>
-              <a:rPr lang="en-US" dirty="0" err="1" smtClean="0"/>
+              <a:rPr lang="en-US" b="1" dirty="0" err="1" smtClean="0">
+                <a:latin typeface="+mj-lt"/>
+              </a:rPr>
               <a:t>Bak</a:t>
             </a:r>
             <a:r>
-              <a:rPr lang="en-US" dirty="0" smtClean="0"/>
+              <a:rPr lang="en-US" b="1" dirty="0" smtClean="0">
+                <a:latin typeface="+mj-lt"/>
+              </a:rPr>
               <a:t>, and Mads Gram</a:t>
             </a:r>
           </a:p>
@@ -3063,6 +3090,13 @@
   <p:clrMapOvr>
     <a:masterClrMapping/>
   </p:clrMapOvr>
+  <p:timing>
+    <p:tnLst>
+      <p:par>
+        <p:cTn id="1" dur="indefinite" restart="never" nodeType="tmRoot"/>
+      </p:par>
+    </p:tnLst>
+  </p:timing>
 </p:sld>
 </file>
 
@@ -3131,7 +3165,7 @@
           <a:bodyPr/>
           <a:lstStyle/>
           <a:p>
-            <a:endParaRPr lang="en-US"/>
+            <a:endParaRPr lang="en-US" dirty="0"/>
           </a:p>
         </p:txBody>
       </p:sp>
@@ -3145,6 +3179,13 @@
   <p:clrMapOvr>
     <a:masterClrMapping/>
   </p:clrMapOvr>
+  <p:timing>
+    <p:tnLst>
+      <p:par>
+        <p:cTn id="1" dur="indefinite" restart="never" nodeType="tmRoot"/>
+      </p:par>
+    </p:tnLst>
+  </p:timing>
 </p:sld>
 </file>
 
@@ -3207,7 +3248,65 @@
           <a:bodyPr/>
           <a:lstStyle/>
           <a:p>
-            <a:endParaRPr lang="en-US"/>
+            <a:pPr>
+              <a:lnSpc>
+                <a:spcPct val="100000"/>
+              </a:lnSpc>
+              <a:spcBef>
+                <a:spcPts val="0"/>
+              </a:spcBef>
+            </a:pPr>
+            <a:endParaRPr lang="en-US" dirty="0" smtClean="0">
+              <a:latin typeface="+mj-lt"/>
+            </a:endParaRPr>
+          </a:p>
+          <a:p>
+            <a:pPr>
+              <a:lnSpc>
+                <a:spcPct val="100000"/>
+              </a:lnSpc>
+              <a:spcBef>
+                <a:spcPts val="0"/>
+              </a:spcBef>
+            </a:pPr>
+            <a:r>
+              <a:rPr lang="en-US" dirty="0" smtClean="0">
+                <a:latin typeface="+mj-lt"/>
+              </a:rPr>
+              <a:t>Testing emails</a:t>
+            </a:r>
+          </a:p>
+          <a:p>
+            <a:pPr>
+              <a:lnSpc>
+                <a:spcPct val="100000"/>
+              </a:lnSpc>
+              <a:spcBef>
+                <a:spcPts val="0"/>
+              </a:spcBef>
+            </a:pPr>
+            <a:endParaRPr lang="en-US" dirty="0">
+              <a:latin typeface="+mj-lt"/>
+            </a:endParaRPr>
+          </a:p>
+          <a:p>
+            <a:pPr>
+              <a:lnSpc>
+                <a:spcPct val="100000"/>
+              </a:lnSpc>
+              <a:spcBef>
+                <a:spcPts val="0"/>
+              </a:spcBef>
+            </a:pPr>
+            <a:r>
+              <a:rPr lang="en-US" dirty="0" smtClean="0">
+                <a:latin typeface="+mj-lt"/>
+              </a:rPr>
+              <a:t>Account validity</a:t>
+            </a:r>
+            <a:endParaRPr lang="en-US" dirty="0">
+              <a:latin typeface="+mj-lt"/>
+            </a:endParaRPr>
           </a:p>
         </p:txBody>
       </p:sp>
@@ -3221,6 +3320,13 @@
   <p:clrMapOvr>
     <a:masterClrMapping/>
   </p:clrMapOvr>
+  <p:timing>
+    <p:tnLst>
+      <p:par>
+        <p:cTn id="1" dur="indefinite" restart="never" nodeType="tmRoot"/>
+      </p:par>
+    </p:tnLst>
+  </p:timing>
 </p:sld>
 </file>
 
@@ -3257,54 +3363,384 @@
           <a:lstStyle/>
           <a:p>
             <a:r>
+              <a:rPr lang="en-US" dirty="0" smtClean="0"/>
+              <a:t>Python Code Example</a:t>
+            </a:r>
+            <a:endParaRPr lang="en-US" dirty="0"/>
+          </a:p>
+        </p:txBody>
+      </p:sp>
+      <p:sp>
+        <p:nvSpPr>
+          <p:cNvPr id="3" name="Content Placeholder 2"/>
+          <p:cNvSpPr>
+            <a:spLocks noGrp="1"/>
+          </p:cNvSpPr>
+          <p:nvPr>
+            <p:ph idx="1"/>
+          </p:nvPr>
+        </p:nvSpPr>
+        <p:spPr/>
+        <p:txBody>
+          <a:bodyPr/>
+          <a:lstStyle/>
+          <a:p>
+            <a:r>
+              <a:rPr lang="en-US" b="1" dirty="0">
+                <a:solidFill>
+                  <a:srgbClr val="007020"/>
+                </a:solidFill>
+              </a:rPr>
+              <a:t>if</a:t>
+            </a:r>
+            <a:r>
               <a:rPr lang="en-US" dirty="0"/>
-              <a:t>Estimating the </a:t>
+              <a:t> ( </a:t>
+            </a:r>
+            <a:r>
+              <a:rPr lang="en-US" dirty="0" err="1">
+                <a:solidFill>
+                  <a:srgbClr val="007020"/>
+                </a:solidFill>
+              </a:rPr>
+              <a:t>len</a:t>
+            </a:r>
+            <a:r>
+              <a:rPr lang="en-US" dirty="0"/>
+              <a:t>(</a:t>
+            </a:r>
+            <a:r>
+              <a:rPr lang="en-US" dirty="0" err="1"/>
+              <a:t>request</a:t>
+            </a:r>
+            <a:r>
+              <a:rPr lang="en-US" dirty="0" err="1">
+                <a:solidFill>
+                  <a:srgbClr val="666666"/>
+                </a:solidFill>
+              </a:rPr>
+              <a:t>.</a:t>
+            </a:r>
+            <a:r>
+              <a:rPr lang="en-US" dirty="0" err="1"/>
+              <a:t>form</a:t>
+            </a:r>
+            <a:r>
+              <a:rPr lang="en-US" dirty="0"/>
+              <a:t>[</a:t>
+            </a:r>
+            <a:r>
+              <a:rPr lang="en-US" dirty="0">
+                <a:solidFill>
+                  <a:srgbClr val="4070A0"/>
+                </a:solidFill>
+              </a:rPr>
+              <a:t>"password"</a:t>
+            </a:r>
+            <a:r>
+              <a:rPr lang="en-US" dirty="0"/>
+              <a:t>]) </a:t>
+            </a:r>
+            <a:r>
+              <a:rPr lang="en-US" dirty="0">
+                <a:solidFill>
+                  <a:srgbClr val="666666"/>
+                </a:solidFill>
+              </a:rPr>
+              <a:t>==</a:t>
+            </a:r>
+            <a:r>
+              <a:rPr lang="en-US" dirty="0"/>
+              <a:t> </a:t>
+            </a:r>
+            <a:r>
+              <a:rPr lang="en-US" dirty="0" err="1">
+                <a:solidFill>
+                  <a:srgbClr val="007020"/>
+                </a:solidFill>
+              </a:rPr>
+              <a:t>len</a:t>
+            </a:r>
+            <a:r>
+              <a:rPr lang="en-US" dirty="0"/>
+              <a:t>(</a:t>
+            </a:r>
+            <a:r>
+              <a:rPr lang="en-US" dirty="0" err="1"/>
+              <a:t>secretPassword</a:t>
             </a:r>
             <a:r>
               <a:rPr lang="en-US" dirty="0" smtClean="0"/>
-              <a:t>Size </a:t>
+              <a:t>)):</a:t>
+            </a:r>
+            <a:br>
+              <a:rPr lang="en-US" dirty="0" smtClean="0"/>
+            </a:br>
+            <a:r>
+              <a:rPr lang="en-US" dirty="0" smtClean="0"/>
+              <a:t>	</a:t>
+            </a:r>
+            <a:r>
+              <a:rPr lang="en-US" b="1" dirty="0" smtClean="0">
+                <a:solidFill>
+                  <a:srgbClr val="007020"/>
+                </a:solidFill>
+              </a:rPr>
+              <a:t>for</a:t>
+            </a:r>
+            <a:r>
+              <a:rPr lang="en-US" dirty="0" smtClean="0"/>
+              <a:t> </a:t>
+            </a:r>
+            <a:r>
+              <a:rPr lang="en-US" dirty="0" err="1"/>
+              <a:t>i</a:t>
             </a:r>
             <a:r>
               <a:rPr lang="en-US" dirty="0"/>
-              <a:t>of </a:t>
+              <a:t> </a:t>
+            </a:r>
+            <a:r>
+              <a:rPr lang="en-US" b="1" dirty="0">
+                <a:solidFill>
+                  <a:srgbClr val="007020"/>
+                </a:solidFill>
+              </a:rPr>
+              <a:t>in</a:t>
+            </a:r>
+            <a:r>
+              <a:rPr lang="en-US" dirty="0"/>
+              <a:t> </a:t>
+            </a:r>
+            <a:r>
+              <a:rPr lang="en-US" dirty="0">
+                <a:solidFill>
+                  <a:srgbClr val="007020"/>
+                </a:solidFill>
+              </a:rPr>
+              <a:t>range</a:t>
+            </a:r>
+            <a:r>
+              <a:rPr lang="en-US" dirty="0"/>
+              <a:t>(</a:t>
+            </a:r>
+            <a:r>
+              <a:rPr lang="en-US" dirty="0" err="1">
+                <a:solidFill>
+                  <a:srgbClr val="007020"/>
+                </a:solidFill>
+              </a:rPr>
+              <a:t>len</a:t>
+            </a:r>
+            <a:r>
+              <a:rPr lang="en-US" dirty="0"/>
+              <a:t>(</a:t>
+            </a:r>
+            <a:r>
+              <a:rPr lang="en-US" dirty="0" err="1"/>
+              <a:t>request</a:t>
+            </a:r>
+            <a:r>
+              <a:rPr lang="en-US" dirty="0" err="1">
+                <a:solidFill>
+                  <a:srgbClr val="666666"/>
+                </a:solidFill>
+              </a:rPr>
+              <a:t>.</a:t>
+            </a:r>
+            <a:r>
+              <a:rPr lang="en-US" dirty="0" err="1"/>
+              <a:t>form</a:t>
+            </a:r>
+            <a:r>
+              <a:rPr lang="en-US" dirty="0"/>
+              <a:t>[</a:t>
+            </a:r>
+            <a:r>
+              <a:rPr lang="en-US" dirty="0">
+                <a:solidFill>
+                  <a:srgbClr val="4070A0"/>
+                </a:solidFill>
+              </a:rPr>
+              <a:t>"password"</a:t>
+            </a:r>
+            <a:r>
+              <a:rPr lang="en-US" dirty="0"/>
+              <a:t>])): </a:t>
             </a:r>
             <a:r>
               <a:rPr lang="en-US" dirty="0" smtClean="0"/>
-              <a:t>Hidden Data</a:t>
+              <a:t/>
+            </a:r>
+            <a:br>
+              <a:rPr lang="en-US" dirty="0" smtClean="0"/>
+            </a:br>
+            <a:r>
+              <a:rPr lang="en-US" dirty="0" smtClean="0"/>
+              <a:t>		</a:t>
+            </a:r>
+            <a:r>
+              <a:rPr lang="en-US" b="1" dirty="0" smtClean="0">
+                <a:solidFill>
+                  <a:srgbClr val="007020"/>
+                </a:solidFill>
+              </a:rPr>
+              <a:t>if</a:t>
+            </a:r>
+            <a:r>
+              <a:rPr lang="en-US" dirty="0" smtClean="0"/>
+              <a:t> </a:t>
+            </a:r>
+            <a:r>
+              <a:rPr lang="en-US" dirty="0" err="1"/>
+              <a:t>request</a:t>
+            </a:r>
+            <a:r>
+              <a:rPr lang="en-US" dirty="0" err="1">
+                <a:solidFill>
+                  <a:srgbClr val="666666"/>
+                </a:solidFill>
+              </a:rPr>
+              <a:t>.</a:t>
+            </a:r>
+            <a:r>
+              <a:rPr lang="en-US" dirty="0" err="1"/>
+              <a:t>form</a:t>
+            </a:r>
+            <a:r>
+              <a:rPr lang="en-US" dirty="0"/>
+              <a:t>[</a:t>
+            </a:r>
+            <a:r>
+              <a:rPr lang="en-US" dirty="0">
+                <a:solidFill>
+                  <a:srgbClr val="4070A0"/>
+                </a:solidFill>
+              </a:rPr>
+              <a:t>"password"</a:t>
+            </a:r>
+            <a:r>
+              <a:rPr lang="en-US" dirty="0"/>
+              <a:t>][</a:t>
+            </a:r>
+            <a:r>
+              <a:rPr lang="en-US" dirty="0" err="1"/>
+              <a:t>i</a:t>
+            </a:r>
+            <a:r>
+              <a:rPr lang="en-US" dirty="0"/>
+              <a:t>] </a:t>
+            </a:r>
+            <a:r>
+              <a:rPr lang="en-US" dirty="0">
+                <a:solidFill>
+                  <a:srgbClr val="666666"/>
+                </a:solidFill>
+              </a:rPr>
+              <a:t>==</a:t>
+            </a:r>
+            <a:r>
+              <a:rPr lang="en-US" dirty="0"/>
+              <a:t> </a:t>
+            </a:r>
+            <a:r>
+              <a:rPr lang="en-US" dirty="0" err="1"/>
+              <a:t>secretPassword</a:t>
+            </a:r>
+            <a:r>
+              <a:rPr lang="en-US" dirty="0"/>
+              <a:t>[</a:t>
+            </a:r>
+            <a:r>
+              <a:rPr lang="en-US" dirty="0" err="1"/>
+              <a:t>i</a:t>
+            </a:r>
+            <a:r>
+              <a:rPr lang="en-US" dirty="0"/>
+              <a:t>]: </a:t>
+            </a:r>
+            <a:r>
+              <a:rPr lang="en-US" dirty="0" smtClean="0"/>
+              <a:t/>
+            </a:r>
+            <a:br>
+              <a:rPr lang="en-US" dirty="0" smtClean="0"/>
+            </a:br>
+            <a:r>
+              <a:rPr lang="en-US" dirty="0" smtClean="0"/>
+              <a:t>			</a:t>
+            </a:r>
+            <a:r>
+              <a:rPr lang="en-US" b="1" dirty="0" smtClean="0">
+                <a:solidFill>
+                  <a:srgbClr val="007020"/>
+                </a:solidFill>
+              </a:rPr>
+              <a:t>continue</a:t>
+            </a:r>
+            <a:r>
+              <a:rPr lang="en-US" dirty="0" smtClean="0"/>
+              <a:t> </a:t>
+            </a:r>
+            <a:br>
+              <a:rPr lang="en-US" dirty="0" smtClean="0"/>
+            </a:br>
+            <a:r>
+              <a:rPr lang="en-US" dirty="0" smtClean="0"/>
+              <a:t>		</a:t>
+            </a:r>
+            <a:r>
+              <a:rPr lang="en-US" b="1" dirty="0" smtClean="0">
+                <a:solidFill>
+                  <a:srgbClr val="007020"/>
+                </a:solidFill>
+              </a:rPr>
+              <a:t>else</a:t>
+            </a:r>
+            <a:r>
+              <a:rPr lang="en-US" dirty="0"/>
+              <a:t>: </a:t>
+            </a:r>
+            <a:r>
+              <a:rPr lang="en-US" dirty="0" smtClean="0"/>
+              <a:t/>
+            </a:r>
+            <a:br>
+              <a:rPr lang="en-US" dirty="0" smtClean="0"/>
+            </a:br>
+            <a:r>
+              <a:rPr lang="en-US" dirty="0" smtClean="0"/>
+              <a:t>			</a:t>
+            </a:r>
+            <a:r>
+              <a:rPr lang="en-US" b="1" dirty="0" smtClean="0">
+                <a:solidFill>
+                  <a:srgbClr val="007020"/>
+                </a:solidFill>
+              </a:rPr>
+              <a:t>break</a:t>
             </a:r>
             <a:endParaRPr lang="en-US" dirty="0"/>
-          </a:p>
-        </p:txBody>
-      </p:sp>
-      <p:sp>
-        <p:nvSpPr>
-          <p:cNvPr id="3" name="Content Placeholder 2"/>
-          <p:cNvSpPr>
-            <a:spLocks noGrp="1"/>
-          </p:cNvSpPr>
-          <p:nvPr>
-            <p:ph idx="1"/>
-          </p:nvPr>
-        </p:nvSpPr>
-        <p:spPr/>
-        <p:txBody>
-          <a:bodyPr/>
-          <a:lstStyle/>
-          <a:p>
-            <a:endParaRPr lang="en-US"/>
           </a:p>
         </p:txBody>
       </p:sp>
     </p:spTree>
     <p:extLst>
       <p:ext uri="{BB962C8B-B14F-4D97-AF65-F5344CB8AC3E}">
-        <p14:creationId xmlns:p14="http://schemas.microsoft.com/office/powerpoint/2010/main" val="1480580772"/>
+        <p14:creationId xmlns:p14="http://schemas.microsoft.com/office/powerpoint/2010/main" val="981566798"/>
       </p:ext>
     </p:extLst>
   </p:cSld>
   <p:clrMapOvr>
     <a:masterClrMapping/>
   </p:clrMapOvr>
+  <p:timing>
+    <p:tnLst>
+      <p:par>
+        <p:cTn id="1" dur="indefinite" restart="never" nodeType="tmRoot"/>
+      </p:par>
+    </p:tnLst>
+  </p:timing>
 </p:sld>
 </file>
 
@@ -3342,6 +3778,175 @@
           <a:p>
             <a:r>
               <a:rPr lang="en-US" dirty="0"/>
+              <a:t>Estimating the </a:t>
+            </a:r>
+            <a:r>
+              <a:rPr lang="en-US" dirty="0" smtClean="0"/>
+              <a:t>Size </a:t>
+            </a:r>
+            <a:r>
+              <a:rPr lang="en-US" dirty="0"/>
+              <a:t>of </a:t>
+            </a:r>
+            <a:r>
+              <a:rPr lang="en-US" dirty="0" smtClean="0"/>
+              <a:t>Hidden Data</a:t>
+            </a:r>
+            <a:endParaRPr lang="en-US" dirty="0"/>
+          </a:p>
+        </p:txBody>
+      </p:sp>
+      <p:pic>
+        <p:nvPicPr>
+          <p:cNvPr id="4" name="Content Placeholder 3"/>
+          <p:cNvPicPr>
+            <a:picLocks noGrp="1" noChangeAspect="1"/>
+          </p:cNvPicPr>
+          <p:nvPr>
+            <p:ph idx="1"/>
+          </p:nvPr>
+        </p:nvPicPr>
+        <p:blipFill>
+          <a:blip r:embed="rId2">
+            <a:extLst>
+              <a:ext uri="{28A0092B-C50C-407E-A947-70E740481C1C}">
+                <a14:useLocalDpi xmlns:a14="http://schemas.microsoft.com/office/drawing/2010/main" val="0"/>
+              </a:ext>
+            </a:extLst>
+          </a:blip>
+          <a:stretch>
+            <a:fillRect/>
+          </a:stretch>
+        </p:blipFill>
+        <p:spPr>
+          <a:xfrm>
+            <a:off x="838200" y="1690688"/>
+            <a:ext cx="5068927" cy="5068927"/>
+          </a:xfrm>
+        </p:spPr>
+      </p:pic>
+      <p:sp>
+        <p:nvSpPr>
+          <p:cNvPr id="6" name="TextBox 5"/>
+          <p:cNvSpPr txBox="1"/>
+          <p:nvPr/>
+        </p:nvSpPr>
+        <p:spPr>
+          <a:xfrm>
+            <a:off x="5907127" y="6113284"/>
+            <a:ext cx="5537413" cy="646331"/>
+          </a:xfrm>
+          <a:prstGeom prst="rect">
+            <a:avLst/>
+          </a:prstGeom>
+          <a:noFill/>
+        </p:spPr>
+        <p:txBody>
+          <a:bodyPr wrap="none" rtlCol="0">
+            <a:spAutoFit/>
+          </a:bodyPr>
+          <a:lstStyle/>
+          <a:p>
+            <a:r>
+              <a:rPr lang="en-US" dirty="0"/>
+              <a:t>Andrew </a:t>
+            </a:r>
+            <a:r>
+              <a:rPr lang="en-US" dirty="0" err="1" smtClean="0"/>
+              <a:t>Bortz</a:t>
+            </a:r>
+            <a:r>
+              <a:rPr lang="en-US" dirty="0" smtClean="0"/>
+              <a:t>, Dan </a:t>
+            </a:r>
+            <a:r>
+              <a:rPr lang="en-US" dirty="0" err="1" smtClean="0"/>
+              <a:t>Boneh</a:t>
+            </a:r>
+            <a:r>
+              <a:rPr lang="en-US" dirty="0" smtClean="0"/>
+              <a:t>, </a:t>
+            </a:r>
+            <a:r>
+              <a:rPr lang="en-US" dirty="0" err="1" smtClean="0"/>
+              <a:t>Palash</a:t>
+            </a:r>
+            <a:r>
+              <a:rPr lang="en-US" dirty="0" smtClean="0"/>
+              <a:t> </a:t>
+            </a:r>
+            <a:r>
+              <a:rPr lang="en-US" dirty="0" err="1" smtClean="0"/>
+              <a:t>Nardy</a:t>
+            </a:r>
+            <a:r>
+              <a:rPr lang="en-US" dirty="0"/>
+              <a:t/>
+            </a:r>
+            <a:br>
+              <a:rPr lang="en-US" dirty="0"/>
+            </a:br>
+            <a:r>
+              <a:rPr lang="en-US" dirty="0"/>
+              <a:t>Exposing Private Information by Timing Web Applications</a:t>
+            </a:r>
+          </a:p>
+        </p:txBody>
+      </p:sp>
+    </p:spTree>
+    <p:extLst>
+      <p:ext uri="{BB962C8B-B14F-4D97-AF65-F5344CB8AC3E}">
+        <p14:creationId xmlns:p14="http://schemas.microsoft.com/office/powerpoint/2010/main" val="1480580772"/>
+      </p:ext>
+    </p:extLst>
+  </p:cSld>
+  <p:clrMapOvr>
+    <a:masterClrMapping/>
+  </p:clrMapOvr>
+  <p:timing>
+    <p:tnLst>
+      <p:par>
+        <p:cTn id="1" dur="indefinite" restart="never" nodeType="tmRoot"/>
+      </p:par>
+    </p:tnLst>
+  </p:timing>
+</p:sld>
+</file>
+
+<file path=ppt/slides/slide6.xml><?xml version="1.0" encoding="utf-8"?>
+<p:sld xmlns:a="http://schemas.openxmlformats.org/drawingml/2006/main" xmlns:r="http://schemas.openxmlformats.org/officeDocument/2006/relationships" xmlns:p="http://schemas.openxmlformats.org/presentationml/2006/main">
+  <p:cSld>
+    <p:spTree>
+      <p:nvGrpSpPr>
+        <p:cNvPr id="1" name=""/>
+        <p:cNvGrpSpPr/>
+        <p:nvPr/>
+      </p:nvGrpSpPr>
+      <p:grpSpPr>
+        <a:xfrm>
+          <a:off x="0" y="0"/>
+          <a:ext cx="0" cy="0"/>
+          <a:chOff x="0" y="0"/>
+          <a:chExt cx="0" cy="0"/>
+        </a:xfrm>
+      </p:grpSpPr>
+      <p:sp>
+        <p:nvSpPr>
+          <p:cNvPr id="2" name="Title 1"/>
+          <p:cNvSpPr>
+            <a:spLocks noGrp="1"/>
+          </p:cNvSpPr>
+          <p:nvPr>
+            <p:ph type="title"/>
+          </p:nvPr>
+        </p:nvSpPr>
+        <p:spPr/>
+        <p:txBody>
+          <a:bodyPr/>
+          <a:lstStyle/>
+          <a:p>
+            <a:r>
+              <a:rPr lang="en-US" dirty="0"/>
               <a:t>Cross-site </a:t>
             </a:r>
             <a:r>
@@ -3367,7 +3972,49 @@
           <a:bodyPr/>
           <a:lstStyle/>
           <a:p>
-            <a:endParaRPr lang="en-US"/>
+            <a:r>
+              <a:rPr lang="en-US" dirty="0">
+                <a:latin typeface="+mj-lt"/>
+              </a:rPr>
+              <a:t>B</a:t>
+            </a:r>
+            <a:r>
+              <a:rPr lang="en-US" dirty="0" smtClean="0">
+                <a:latin typeface="+mj-lt"/>
+              </a:rPr>
+              <a:t>rowser </a:t>
+            </a:r>
+            <a:r>
+              <a:rPr lang="en-US" dirty="0">
+                <a:latin typeface="+mj-lt"/>
+              </a:rPr>
+              <a:t>restrictions </a:t>
+            </a:r>
+            <a:endParaRPr lang="en-US" dirty="0">
+              <a:latin typeface="+mj-lt"/>
+            </a:endParaRPr>
+          </a:p>
+          <a:p>
+            <a:endParaRPr lang="en-US" dirty="0" smtClean="0">
+              <a:latin typeface="+mj-lt"/>
+            </a:endParaRPr>
+          </a:p>
+          <a:p>
+            <a:r>
+              <a:rPr lang="en-US" dirty="0" smtClean="0">
+                <a:latin typeface="+mj-lt"/>
+              </a:rPr>
+              <a:t>Embedded </a:t>
+            </a:r>
+            <a:r>
+              <a:rPr lang="en-US" dirty="0">
+                <a:latin typeface="+mj-lt"/>
+              </a:rPr>
+              <a:t>pages using tags</a:t>
+            </a:r>
+            <a:endParaRPr lang="en-US" dirty="0">
+              <a:latin typeface="+mj-lt"/>
+            </a:endParaRPr>
           </a:p>
         </p:txBody>
       </p:sp>
@@ -3375,6 +4022,391 @@
     <p:extLst>
       <p:ext uri="{BB962C8B-B14F-4D97-AF65-F5344CB8AC3E}">
         <p14:creationId xmlns:p14="http://schemas.microsoft.com/office/powerpoint/2010/main" val="30917658"/>
+      </p:ext>
+    </p:extLst>
+  </p:cSld>
+  <p:clrMapOvr>
+    <a:masterClrMapping/>
+  </p:clrMapOvr>
+  <p:timing>
+    <p:tnLst>
+      <p:par>
+        <p:cTn id="1" dur="indefinite" restart="never" nodeType="tmRoot"/>
+      </p:par>
+    </p:tnLst>
+  </p:timing>
+</p:sld>
+</file>
+
+<file path=ppt/slides/slide7.xml><?xml version="1.0" encoding="utf-8"?>
+<p:sld xmlns:a="http://schemas.openxmlformats.org/drawingml/2006/main" xmlns:r="http://schemas.openxmlformats.org/officeDocument/2006/relationships" xmlns:p="http://schemas.openxmlformats.org/presentationml/2006/main">
+  <p:cSld>
+    <p:spTree>
+      <p:nvGrpSpPr>
+        <p:cNvPr id="1" name=""/>
+        <p:cNvGrpSpPr/>
+        <p:nvPr/>
+      </p:nvGrpSpPr>
+      <p:grpSpPr>
+        <a:xfrm>
+          <a:off x="0" y="0"/>
+          <a:ext cx="0" cy="0"/>
+          <a:chOff x="0" y="0"/>
+          <a:chExt cx="0" cy="0"/>
+        </a:xfrm>
+      </p:grpSpPr>
+      <p:sp>
+        <p:nvSpPr>
+          <p:cNvPr id="2" name="Title 1"/>
+          <p:cNvSpPr>
+            <a:spLocks noGrp="1"/>
+          </p:cNvSpPr>
+          <p:nvPr>
+            <p:ph type="title"/>
+          </p:nvPr>
+        </p:nvSpPr>
+        <p:spPr/>
+        <p:txBody>
+          <a:bodyPr/>
+          <a:lstStyle/>
+          <a:p>
+            <a:r>
+              <a:rPr lang="en-US" dirty="0" smtClean="0"/>
+              <a:t>Why it’s Difficult</a:t>
+            </a:r>
+            <a:endParaRPr lang="en-US" dirty="0"/>
+          </a:p>
+        </p:txBody>
+      </p:sp>
+      <p:sp>
+        <p:nvSpPr>
+          <p:cNvPr id="3" name="Content Placeholder 2"/>
+          <p:cNvSpPr>
+            <a:spLocks noGrp="1"/>
+          </p:cNvSpPr>
+          <p:nvPr>
+            <p:ph idx="1"/>
+          </p:nvPr>
+        </p:nvSpPr>
+        <p:spPr/>
+        <p:txBody>
+          <a:bodyPr/>
+          <a:lstStyle/>
+          <a:p>
+            <a:r>
+              <a:rPr lang="en-US" dirty="0" smtClean="0">
+                <a:latin typeface="+mj-lt"/>
+                <a:ea typeface="Cambria" charset="0"/>
+                <a:cs typeface="Cambria" charset="0"/>
+              </a:rPr>
+              <a:t>Varying </a:t>
+            </a:r>
+            <a:r>
+              <a:rPr lang="en-US" dirty="0">
+                <a:latin typeface="+mj-lt"/>
+                <a:ea typeface="Cambria" charset="0"/>
+                <a:cs typeface="Cambria" charset="0"/>
+              </a:rPr>
+              <a:t>internet connections </a:t>
+            </a:r>
+            <a:endParaRPr lang="en-US" dirty="0">
+              <a:latin typeface="+mj-lt"/>
+              <a:ea typeface="Cambria" charset="0"/>
+              <a:cs typeface="Cambria" charset="0"/>
+            </a:endParaRPr>
+          </a:p>
+          <a:p>
+            <a:endParaRPr lang="en-US" dirty="0" smtClean="0">
+              <a:latin typeface="+mj-lt"/>
+              <a:ea typeface="Cambria" charset="0"/>
+              <a:cs typeface="Cambria" charset="0"/>
+            </a:endParaRPr>
+          </a:p>
+          <a:p>
+            <a:r>
+              <a:rPr lang="en-US" dirty="0" smtClean="0">
+                <a:latin typeface="+mj-lt"/>
+                <a:ea typeface="Cambria" charset="0"/>
+                <a:cs typeface="Cambria" charset="0"/>
+              </a:rPr>
+              <a:t>Using </a:t>
+            </a:r>
+            <a:r>
+              <a:rPr lang="en-US" dirty="0">
+                <a:latin typeface="+mj-lt"/>
+                <a:ea typeface="Cambria" charset="0"/>
+                <a:cs typeface="Cambria" charset="0"/>
+              </a:rPr>
+              <a:t>several sources </a:t>
+            </a:r>
+            <a:endParaRPr lang="en-US" dirty="0" smtClean="0">
+              <a:latin typeface="+mj-lt"/>
+              <a:ea typeface="Cambria" charset="0"/>
+              <a:cs typeface="Cambria" charset="0"/>
+            </a:endParaRPr>
+          </a:p>
+          <a:p>
+            <a:endParaRPr lang="en-US" dirty="0">
+              <a:latin typeface="+mj-lt"/>
+              <a:ea typeface="Cambria" charset="0"/>
+              <a:cs typeface="Cambria" charset="0"/>
+            </a:endParaRPr>
+          </a:p>
+          <a:p>
+            <a:r>
+              <a:rPr lang="en-US" dirty="0" smtClean="0">
+                <a:latin typeface="+mj-lt"/>
+                <a:ea typeface="Cambria" charset="0"/>
+                <a:cs typeface="Cambria" charset="0"/>
+              </a:rPr>
+              <a:t>Responses </a:t>
+            </a:r>
+            <a:r>
+              <a:rPr lang="en-US" dirty="0">
+                <a:latin typeface="+mj-lt"/>
+                <a:ea typeface="Cambria" charset="0"/>
+                <a:cs typeface="Cambria" charset="0"/>
+              </a:rPr>
+              <a:t>as chunks </a:t>
+            </a:r>
+            <a:r>
+              <a:rPr lang="en-US" dirty="0">
+                <a:latin typeface="+mj-lt"/>
+                <a:ea typeface="Cambria" charset="0"/>
+                <a:cs typeface="Cambria" charset="0"/>
+              </a:rPr>
+              <a:t/>
+            </a:r>
+            <a:br>
+              <a:rPr lang="en-US" dirty="0">
+                <a:latin typeface="+mj-lt"/>
+                <a:ea typeface="Cambria" charset="0"/>
+                <a:cs typeface="Cambria" charset="0"/>
+              </a:rPr>
+            </a:br>
+            <a:endParaRPr lang="en-US" dirty="0">
+              <a:latin typeface="+mj-lt"/>
+              <a:ea typeface="Cambria" charset="0"/>
+              <a:cs typeface="Cambria" charset="0"/>
+            </a:endParaRPr>
+          </a:p>
+        </p:txBody>
+      </p:sp>
+    </p:spTree>
+    <p:extLst>
+      <p:ext uri="{BB962C8B-B14F-4D97-AF65-F5344CB8AC3E}">
+        <p14:creationId xmlns:p14="http://schemas.microsoft.com/office/powerpoint/2010/main" val="260221611"/>
+      </p:ext>
+    </p:extLst>
+  </p:cSld>
+  <p:clrMapOvr>
+    <a:masterClrMapping/>
+  </p:clrMapOvr>
+</p:sld>
+</file>
+
+<file path=ppt/slides/slide8.xml><?xml version="1.0" encoding="utf-8"?>
+<p:sld xmlns:a="http://schemas.openxmlformats.org/drawingml/2006/main" xmlns:r="http://schemas.openxmlformats.org/officeDocument/2006/relationships" xmlns:p="http://schemas.openxmlformats.org/presentationml/2006/main">
+  <p:cSld>
+    <p:spTree>
+      <p:nvGrpSpPr>
+        <p:cNvPr id="1" name=""/>
+        <p:cNvGrpSpPr/>
+        <p:nvPr/>
+      </p:nvGrpSpPr>
+      <p:grpSpPr>
+        <a:xfrm>
+          <a:off x="0" y="0"/>
+          <a:ext cx="0" cy="0"/>
+          <a:chOff x="0" y="0"/>
+          <a:chExt cx="0" cy="0"/>
+        </a:xfrm>
+      </p:grpSpPr>
+      <p:sp>
+        <p:nvSpPr>
+          <p:cNvPr id="2" name="Title 1"/>
+          <p:cNvSpPr>
+            <a:spLocks noGrp="1"/>
+          </p:cNvSpPr>
+          <p:nvPr>
+            <p:ph type="title"/>
+          </p:nvPr>
+        </p:nvSpPr>
+        <p:spPr/>
+        <p:txBody>
+          <a:bodyPr/>
+          <a:lstStyle/>
+          <a:p>
+            <a:r>
+              <a:rPr lang="en-US" dirty="0" smtClean="0"/>
+              <a:t>Testing Boolean Values</a:t>
+            </a:r>
+            <a:endParaRPr lang="en-US" dirty="0"/>
+          </a:p>
+        </p:txBody>
+      </p:sp>
+      <p:sp>
+        <p:nvSpPr>
+          <p:cNvPr id="3" name="Content Placeholder 2"/>
+          <p:cNvSpPr>
+            <a:spLocks noGrp="1"/>
+          </p:cNvSpPr>
+          <p:nvPr>
+            <p:ph idx="1"/>
+          </p:nvPr>
+        </p:nvSpPr>
+        <p:spPr/>
+        <p:txBody>
+          <a:bodyPr/>
+          <a:lstStyle/>
+          <a:p>
+            <a:endParaRPr lang="en-US" dirty="0">
+              <a:latin typeface="+mj-lt"/>
+            </a:endParaRPr>
+          </a:p>
+          <a:p>
+            <a:r>
+              <a:rPr lang="en-US" dirty="0" smtClean="0">
+                <a:latin typeface="+mj-lt"/>
+              </a:rPr>
+              <a:t>User </a:t>
+            </a:r>
+            <a:r>
+              <a:rPr lang="en-US" dirty="0">
+                <a:latin typeface="+mj-lt"/>
+              </a:rPr>
+              <a:t>logged on or </a:t>
+            </a:r>
+            <a:r>
+              <a:rPr lang="en-US" dirty="0" smtClean="0">
+                <a:latin typeface="+mj-lt"/>
+              </a:rPr>
+              <a:t>not</a:t>
+            </a:r>
+            <a:endParaRPr lang="en-US" dirty="0">
+              <a:latin typeface="+mj-lt"/>
+            </a:endParaRPr>
+          </a:p>
+        </p:txBody>
+      </p:sp>
+    </p:spTree>
+    <p:extLst>
+      <p:ext uri="{BB962C8B-B14F-4D97-AF65-F5344CB8AC3E}">
+        <p14:creationId xmlns:p14="http://schemas.microsoft.com/office/powerpoint/2010/main" val="4572774"/>
+      </p:ext>
+    </p:extLst>
+  </p:cSld>
+  <p:clrMapOvr>
+    <a:masterClrMapping/>
+  </p:clrMapOvr>
+</p:sld>
+</file>
+
+<file path=ppt/slides/slide9.xml><?xml version="1.0" encoding="utf-8"?>
+<p:sld xmlns:a="http://schemas.openxmlformats.org/drawingml/2006/main" xmlns:r="http://schemas.openxmlformats.org/officeDocument/2006/relationships" xmlns:p="http://schemas.openxmlformats.org/presentationml/2006/main">
+  <p:cSld>
+    <p:spTree>
+      <p:nvGrpSpPr>
+        <p:cNvPr id="1" name=""/>
+        <p:cNvGrpSpPr/>
+        <p:nvPr/>
+      </p:nvGrpSpPr>
+      <p:grpSpPr>
+        <a:xfrm>
+          <a:off x="0" y="0"/>
+          <a:ext cx="0" cy="0"/>
+          <a:chOff x="0" y="0"/>
+          <a:chExt cx="0" cy="0"/>
+        </a:xfrm>
+      </p:grpSpPr>
+      <p:sp>
+        <p:nvSpPr>
+          <p:cNvPr id="2" name="Title 1"/>
+          <p:cNvSpPr>
+            <a:spLocks noGrp="1"/>
+          </p:cNvSpPr>
+          <p:nvPr>
+            <p:ph type="title"/>
+          </p:nvPr>
+        </p:nvSpPr>
+        <p:spPr/>
+        <p:txBody>
+          <a:bodyPr/>
+          <a:lstStyle/>
+          <a:p>
+            <a:r>
+              <a:rPr lang="en-US" dirty="0" smtClean="0"/>
+              <a:t>Defenses</a:t>
+            </a:r>
+            <a:endParaRPr lang="en-US" dirty="0"/>
+          </a:p>
+        </p:txBody>
+      </p:sp>
+      <p:sp>
+        <p:nvSpPr>
+          <p:cNvPr id="3" name="Content Placeholder 2"/>
+          <p:cNvSpPr>
+            <a:spLocks noGrp="1"/>
+          </p:cNvSpPr>
+          <p:nvPr>
+            <p:ph idx="1"/>
+          </p:nvPr>
+        </p:nvSpPr>
+        <p:spPr/>
+        <p:txBody>
+          <a:bodyPr/>
+          <a:lstStyle/>
+          <a:p>
+            <a:r>
+              <a:rPr lang="en-US" dirty="0">
+                <a:latin typeface="+mj-lt"/>
+              </a:rPr>
+              <a:t>F</a:t>
+            </a:r>
+            <a:r>
+              <a:rPr lang="en-US" dirty="0" smtClean="0">
+                <a:latin typeface="+mj-lt"/>
+              </a:rPr>
+              <a:t>ixed </a:t>
+            </a:r>
+            <a:r>
+              <a:rPr lang="en-US" dirty="0">
+                <a:latin typeface="+mj-lt"/>
+              </a:rPr>
+              <a:t>response time </a:t>
+            </a:r>
+            <a:endParaRPr lang="en-US" dirty="0" smtClean="0">
+              <a:latin typeface="+mj-lt"/>
+            </a:endParaRPr>
+          </a:p>
+          <a:p>
+            <a:endParaRPr lang="en-US" dirty="0" smtClean="0">
+              <a:latin typeface="+mj-lt"/>
+            </a:endParaRPr>
+          </a:p>
+          <a:p>
+            <a:r>
+              <a:rPr lang="en-US" dirty="0" smtClean="0">
+                <a:latin typeface="+mj-lt"/>
+              </a:rPr>
+              <a:t>Responses </a:t>
+            </a:r>
+            <a:r>
+              <a:rPr lang="en-US" dirty="0">
+                <a:latin typeface="+mj-lt"/>
+              </a:rPr>
+              <a:t>as chunks</a:t>
+            </a:r>
+            <a:endParaRPr lang="en-US" dirty="0">
+              <a:latin typeface="+mj-lt"/>
+            </a:endParaRPr>
+          </a:p>
+        </p:txBody>
+      </p:sp>
+    </p:spTree>
+    <p:extLst>
+      <p:ext uri="{BB962C8B-B14F-4D97-AF65-F5344CB8AC3E}">
+        <p14:creationId xmlns:p14="http://schemas.microsoft.com/office/powerpoint/2010/main" val="1621702879"/>
       </p:ext>
     </p:extLst>
   </p:cSld>

</xml_diff>